<commit_message>
add GD notebooks and update slides
</commit_message>
<xml_diff>
--- a/slides/Regerssion.pptx
+++ b/slides/Regerssion.pptx
@@ -5,7 +5,7 @@
     <p:sldMasterId id="2147483648" r:id="rId1"/>
   </p:sldMasterIdLst>
   <p:notesMasterIdLst>
-    <p:notesMasterId r:id="rId57"/>
+    <p:notesMasterId r:id="rId56"/>
   </p:notesMasterIdLst>
   <p:sldIdLst>
     <p:sldId id="256" r:id="rId2"/>
@@ -46,23 +46,22 @@
     <p:sldId id="338" r:id="rId37"/>
     <p:sldId id="385" r:id="rId38"/>
     <p:sldId id="386" r:id="rId39"/>
-    <p:sldId id="387" r:id="rId40"/>
-    <p:sldId id="389" r:id="rId41"/>
-    <p:sldId id="390" r:id="rId42"/>
-    <p:sldId id="391" r:id="rId43"/>
-    <p:sldId id="392" r:id="rId44"/>
-    <p:sldId id="393" r:id="rId45"/>
-    <p:sldId id="394" r:id="rId46"/>
-    <p:sldId id="395" r:id="rId47"/>
-    <p:sldId id="396" r:id="rId48"/>
-    <p:sldId id="397" r:id="rId49"/>
-    <p:sldId id="398" r:id="rId50"/>
-    <p:sldId id="399" r:id="rId51"/>
-    <p:sldId id="400" r:id="rId52"/>
-    <p:sldId id="401" r:id="rId53"/>
-    <p:sldId id="402" r:id="rId54"/>
-    <p:sldId id="403" r:id="rId55"/>
-    <p:sldId id="404" r:id="rId56"/>
+    <p:sldId id="389" r:id="rId40"/>
+    <p:sldId id="390" r:id="rId41"/>
+    <p:sldId id="391" r:id="rId42"/>
+    <p:sldId id="392" r:id="rId43"/>
+    <p:sldId id="393" r:id="rId44"/>
+    <p:sldId id="394" r:id="rId45"/>
+    <p:sldId id="395" r:id="rId46"/>
+    <p:sldId id="396" r:id="rId47"/>
+    <p:sldId id="397" r:id="rId48"/>
+    <p:sldId id="398" r:id="rId49"/>
+    <p:sldId id="399" r:id="rId50"/>
+    <p:sldId id="400" r:id="rId51"/>
+    <p:sldId id="401" r:id="rId52"/>
+    <p:sldId id="402" r:id="rId53"/>
+    <p:sldId id="403" r:id="rId54"/>
+    <p:sldId id="404" r:id="rId55"/>
   </p:sldIdLst>
   <p:sldSz cx="12192000" cy="6858000"/>
   <p:notesSz cx="6858000" cy="9144000"/>
@@ -4904,7 +4903,7 @@
           <a:p>
             <a:fld id="{3E4FFFBE-A9EA-49FB-A9FD-3F92A437E41C}" type="datetimeFigureOut">
               <a:rPr lang="en-US" smtClean="0"/>
-              <a:t>1/17/2023</a:t>
+              <a:t>1/22/2023</a:t>
             </a:fld>
             <a:endParaRPr lang="en-US"/>
           </a:p>
@@ -5233,7 +5232,7 @@
             <a:fld id="{F9B484FA-2B5D-402C-8866-82FB9580E88F}" type="datetime1">
               <a:rPr lang="en-US" altLang="zh-CN" smtClean="0"/>
               <a:pPr/>
-              <a:t>1/17/2023</a:t>
+              <a:t>1/22/2023</a:t>
             </a:fld>
             <a:endParaRPr lang="en-US" altLang="zh-CN"/>
           </a:p>
@@ -5398,7 +5397,7 @@
             <a:fld id="{24096D65-E56D-40B0-B2DC-8460DA41BF34}" type="datetime1">
               <a:rPr lang="en-US" altLang="zh-CN" smtClean="0"/>
               <a:pPr/>
-              <a:t>1/17/2023</a:t>
+              <a:t>1/22/2023</a:t>
             </a:fld>
             <a:endParaRPr lang="en-US" altLang="zh-CN"/>
           </a:p>
@@ -5558,7 +5557,7 @@
             <a:fld id="{26795A1D-195E-4C89-8A3A-51E535689754}" type="datetime1">
               <a:rPr lang="en-US" altLang="zh-CN" smtClean="0"/>
               <a:pPr/>
-              <a:t>1/17/2023</a:t>
+              <a:t>1/22/2023</a:t>
             </a:fld>
             <a:endParaRPr lang="en-US" altLang="zh-CN"/>
           </a:p>
@@ -5718,7 +5717,7 @@
             <a:fld id="{0C466540-4692-41FC-A07E-838FACA0943E}" type="datetime1">
               <a:rPr lang="en-US" altLang="zh-CN" smtClean="0"/>
               <a:pPr/>
-              <a:t>1/17/2023</a:t>
+              <a:t>1/22/2023</a:t>
             </a:fld>
             <a:endParaRPr lang="en-US" altLang="zh-CN"/>
           </a:p>
@@ -5878,7 +5877,7 @@
             <a:fld id="{3A4BE0D9-54AE-45F8-9B39-8786D4095431}" type="datetime1">
               <a:rPr lang="en-US" altLang="zh-CN" smtClean="0"/>
               <a:pPr/>
-              <a:t>1/17/2023</a:t>
+              <a:t>1/22/2023</a:t>
             </a:fld>
             <a:endParaRPr lang="en-US" altLang="zh-CN"/>
           </a:p>
@@ -6038,7 +6037,7 @@
             <a:fld id="{398F7DB3-8BFD-4340-8D9C-4049D2DACC6C}" type="datetime1">
               <a:rPr lang="en-US" altLang="zh-CN" smtClean="0"/>
               <a:pPr/>
-              <a:t>1/17/2023</a:t>
+              <a:t>1/22/2023</a:t>
             </a:fld>
             <a:endParaRPr lang="en-US" altLang="zh-CN"/>
           </a:p>
@@ -6198,7 +6197,7 @@
             <a:fld id="{B762D7FB-9B65-46D4-A415-A10CCD7E22FE}" type="datetime1">
               <a:rPr lang="en-US" altLang="zh-CN" smtClean="0"/>
               <a:pPr/>
-              <a:t>1/17/2023</a:t>
+              <a:t>1/22/2023</a:t>
             </a:fld>
             <a:endParaRPr lang="en-US" altLang="zh-CN"/>
           </a:p>
@@ -6358,7 +6357,7 @@
             <a:fld id="{C887C9DE-81A7-4EA3-BB32-073F2B72CA34}" type="datetime1">
               <a:rPr lang="en-US" altLang="zh-CN" smtClean="0"/>
               <a:pPr/>
-              <a:t>1/17/2023</a:t>
+              <a:t>1/22/2023</a:t>
             </a:fld>
             <a:endParaRPr lang="en-US" altLang="zh-CN"/>
           </a:p>
@@ -6518,7 +6517,7 @@
             <a:fld id="{D3AB1E12-3E03-46F5-9D06-4D2A0E1FF12A}" type="datetime1">
               <a:rPr lang="en-US" altLang="zh-CN" smtClean="0"/>
               <a:pPr/>
-              <a:t>1/17/2023</a:t>
+              <a:t>1/22/2023</a:t>
             </a:fld>
             <a:endParaRPr lang="en-US" altLang="zh-CN"/>
           </a:p>
@@ -6678,7 +6677,7 @@
             <a:fld id="{4D679B29-DAD1-452C-B403-82A7438CDCBB}" type="datetime1">
               <a:rPr lang="en-US" altLang="zh-CN" smtClean="0"/>
               <a:pPr/>
-              <a:t>1/17/2023</a:t>
+              <a:t>1/22/2023</a:t>
             </a:fld>
             <a:endParaRPr lang="en-US" altLang="zh-CN"/>
           </a:p>
@@ -6838,7 +6837,7 @@
             <a:fld id="{05C0E408-3543-4193-AF2D-B85C7FEE31BA}" type="datetime1">
               <a:rPr lang="en-US" altLang="zh-CN" smtClean="0"/>
               <a:pPr/>
-              <a:t>1/17/2023</a:t>
+              <a:t>1/22/2023</a:t>
             </a:fld>
             <a:endParaRPr lang="en-US" altLang="zh-CN"/>
           </a:p>
@@ -6998,7 +6997,7 @@
             <a:fld id="{99CB4B83-133F-4148-A06C-E677B946CD30}" type="datetime1">
               <a:rPr lang="en-US" altLang="zh-CN" smtClean="0"/>
               <a:pPr/>
-              <a:t>1/17/2023</a:t>
+              <a:t>1/22/2023</a:t>
             </a:fld>
             <a:endParaRPr lang="en-US" altLang="zh-CN"/>
           </a:p>
@@ -7158,7 +7157,7 @@
             <a:fld id="{131235C4-27EB-43DB-804C-ABF2FF6C41AC}" type="datetime1">
               <a:rPr lang="en-US" altLang="zh-CN" smtClean="0"/>
               <a:pPr/>
-              <a:t>1/17/2023</a:t>
+              <a:t>1/22/2023</a:t>
             </a:fld>
             <a:endParaRPr lang="en-US" altLang="zh-CN"/>
           </a:p>
@@ -7318,7 +7317,7 @@
             <a:fld id="{D783C69A-9A04-433E-9A9C-FABB728E58F9}" type="datetime1">
               <a:rPr lang="en-US" altLang="zh-CN" smtClean="0"/>
               <a:pPr/>
-              <a:t>1/17/2023</a:t>
+              <a:t>1/22/2023</a:t>
             </a:fld>
             <a:endParaRPr lang="en-US" altLang="zh-CN"/>
           </a:p>
@@ -7481,7 +7480,7 @@
           <a:p>
             <a:fld id="{1B6A581E-B29D-4C51-B219-220CDB5B01C1}" type="slidenum">
               <a:rPr lang="en-US" smtClean="0"/>
-              <a:t>44</a:t>
+              <a:t>43</a:t>
             </a:fld>
             <a:endParaRPr lang="en-US"/>
           </a:p>
@@ -7562,7 +7561,7 @@
             <a:fld id="{C0A6B9EA-6A8B-44B8-BB92-B61C100788E6}" type="datetime1">
               <a:rPr lang="en-US" altLang="zh-CN" smtClean="0"/>
               <a:pPr/>
-              <a:t>1/17/2023</a:t>
+              <a:t>1/22/2023</a:t>
             </a:fld>
             <a:endParaRPr lang="en-US" altLang="zh-CN"/>
           </a:p>
@@ -7722,7 +7721,7 @@
             <a:fld id="{1C9C5817-D650-4A33-AE0E-A322916835D6}" type="datetime1">
               <a:rPr lang="en-US" altLang="zh-CN" smtClean="0"/>
               <a:pPr/>
-              <a:t>1/17/2023</a:t>
+              <a:t>1/22/2023</a:t>
             </a:fld>
             <a:endParaRPr lang="en-US" altLang="zh-CN"/>
           </a:p>
@@ -7882,7 +7881,7 @@
             <a:fld id="{67D57328-D70F-46B4-964C-2A33FC8E121F}" type="datetime1">
               <a:rPr lang="en-US" altLang="zh-CN" smtClean="0"/>
               <a:pPr/>
-              <a:t>1/17/2023</a:t>
+              <a:t>1/22/2023</a:t>
             </a:fld>
             <a:endParaRPr lang="en-US" altLang="zh-CN"/>
           </a:p>
@@ -8042,7 +8041,7 @@
             <a:fld id="{99CB4B83-133F-4148-A06C-E677B946CD30}" type="datetime1">
               <a:rPr lang="en-US" altLang="zh-CN" smtClean="0"/>
               <a:pPr/>
-              <a:t>1/17/2023</a:t>
+              <a:t>1/22/2023</a:t>
             </a:fld>
             <a:endParaRPr lang="en-US" altLang="zh-CN"/>
           </a:p>
@@ -8202,7 +8201,7 @@
             <a:fld id="{5C56F91C-5AEF-4EF5-A446-2E7AE6A75F24}" type="datetime1">
               <a:rPr lang="en-US" altLang="zh-CN" smtClean="0"/>
               <a:pPr/>
-              <a:t>1/17/2023</a:t>
+              <a:t>1/22/2023</a:t>
             </a:fld>
             <a:endParaRPr lang="en-US" altLang="zh-CN"/>
           </a:p>
@@ -8362,7 +8361,7 @@
             <a:fld id="{FCA1D0D5-C3DD-4551-9A69-053CEE642E26}" type="datetime1">
               <a:rPr lang="en-US" altLang="zh-CN" smtClean="0"/>
               <a:pPr/>
-              <a:t>1/17/2023</a:t>
+              <a:t>1/22/2023</a:t>
             </a:fld>
             <a:endParaRPr lang="en-US" altLang="zh-CN"/>
           </a:p>
@@ -8522,7 +8521,7 @@
             <a:fld id="{0C6D1811-1288-4AFA-A75C-C93CF94D5BE1}" type="datetime1">
               <a:rPr lang="en-US" altLang="zh-CN" smtClean="0"/>
               <a:pPr/>
-              <a:t>1/17/2023</a:t>
+              <a:t>1/22/2023</a:t>
             </a:fld>
             <a:endParaRPr lang="en-US" altLang="zh-CN"/>
           </a:p>
@@ -8767,7 +8766,7 @@
           <a:p>
             <a:fld id="{ADA5A25F-A10E-4FB8-9995-7C14268F19FD}" type="datetimeFigureOut">
               <a:rPr lang="en-US" smtClean="0"/>
-              <a:t>1/17/2023</a:t>
+              <a:t>1/22/2023</a:t>
             </a:fld>
             <a:endParaRPr lang="en-US"/>
           </a:p>
@@ -8965,7 +8964,7 @@
           <a:p>
             <a:fld id="{ADA5A25F-A10E-4FB8-9995-7C14268F19FD}" type="datetimeFigureOut">
               <a:rPr lang="en-US" smtClean="0"/>
-              <a:t>1/17/2023</a:t>
+              <a:t>1/22/2023</a:t>
             </a:fld>
             <a:endParaRPr lang="en-US"/>
           </a:p>
@@ -9173,7 +9172,7 @@
           <a:p>
             <a:fld id="{ADA5A25F-A10E-4FB8-9995-7C14268F19FD}" type="datetimeFigureOut">
               <a:rPr lang="en-US" smtClean="0"/>
-              <a:t>1/17/2023</a:t>
+              <a:t>1/22/2023</a:t>
             </a:fld>
             <a:endParaRPr lang="en-US"/>
           </a:p>
@@ -9429,7 +9428,7 @@
             <a:fld id="{F0816EF0-2F1F-4C77-83E5-BF94D208BAC4}" type="datetime1">
               <a:rPr lang="en-US" altLang="zh-CN" smtClean="0"/>
               <a:pPr/>
-              <a:t>1/17/2023</a:t>
+              <a:t>1/22/2023</a:t>
             </a:fld>
             <a:endParaRPr lang="en-US" altLang="zh-CN"/>
           </a:p>
@@ -9641,7 +9640,7 @@
           <a:p>
             <a:fld id="{ADA5A25F-A10E-4FB8-9995-7C14268F19FD}" type="datetimeFigureOut">
               <a:rPr lang="en-US" smtClean="0"/>
-              <a:t>1/17/2023</a:t>
+              <a:t>1/22/2023</a:t>
             </a:fld>
             <a:endParaRPr lang="en-US"/>
           </a:p>
@@ -9916,7 +9915,7 @@
           <a:p>
             <a:fld id="{ADA5A25F-A10E-4FB8-9995-7C14268F19FD}" type="datetimeFigureOut">
               <a:rPr lang="en-US" smtClean="0"/>
-              <a:t>1/17/2023</a:t>
+              <a:t>1/22/2023</a:t>
             </a:fld>
             <a:endParaRPr lang="en-US"/>
           </a:p>
@@ -10181,7 +10180,7 @@
           <a:p>
             <a:fld id="{ADA5A25F-A10E-4FB8-9995-7C14268F19FD}" type="datetimeFigureOut">
               <a:rPr lang="en-US" smtClean="0"/>
-              <a:t>1/17/2023</a:t>
+              <a:t>1/22/2023</a:t>
             </a:fld>
             <a:endParaRPr lang="en-US"/>
           </a:p>
@@ -10593,7 +10592,7 @@
           <a:p>
             <a:fld id="{ADA5A25F-A10E-4FB8-9995-7C14268F19FD}" type="datetimeFigureOut">
               <a:rPr lang="en-US" smtClean="0"/>
-              <a:t>1/17/2023</a:t>
+              <a:t>1/22/2023</a:t>
             </a:fld>
             <a:endParaRPr lang="en-US"/>
           </a:p>
@@ -10734,7 +10733,7 @@
           <a:p>
             <a:fld id="{ADA5A25F-A10E-4FB8-9995-7C14268F19FD}" type="datetimeFigureOut">
               <a:rPr lang="en-US" smtClean="0"/>
-              <a:t>1/17/2023</a:t>
+              <a:t>1/22/2023</a:t>
             </a:fld>
             <a:endParaRPr lang="en-US"/>
           </a:p>
@@ -10847,7 +10846,7 @@
           <a:p>
             <a:fld id="{ADA5A25F-A10E-4FB8-9995-7C14268F19FD}" type="datetimeFigureOut">
               <a:rPr lang="en-US" smtClean="0"/>
-              <a:t>1/17/2023</a:t>
+              <a:t>1/22/2023</a:t>
             </a:fld>
             <a:endParaRPr lang="en-US"/>
           </a:p>
@@ -11158,7 +11157,7 @@
           <a:p>
             <a:fld id="{ADA5A25F-A10E-4FB8-9995-7C14268F19FD}" type="datetimeFigureOut">
               <a:rPr lang="en-US" smtClean="0"/>
-              <a:t>1/17/2023</a:t>
+              <a:t>1/22/2023</a:t>
             </a:fld>
             <a:endParaRPr lang="en-US"/>
           </a:p>
@@ -11446,7 +11445,7 @@
           <a:p>
             <a:fld id="{ADA5A25F-A10E-4FB8-9995-7C14268F19FD}" type="datetimeFigureOut">
               <a:rPr lang="en-US" smtClean="0"/>
-              <a:t>1/17/2023</a:t>
+              <a:t>1/22/2023</a:t>
             </a:fld>
             <a:endParaRPr lang="en-US"/>
           </a:p>
@@ -11687,7 +11686,7 @@
           <a:p>
             <a:fld id="{ADA5A25F-A10E-4FB8-9995-7C14268F19FD}" type="datetimeFigureOut">
               <a:rPr lang="en-US" smtClean="0"/>
-              <a:t>1/17/2023</a:t>
+              <a:t>1/22/2023</a:t>
             </a:fld>
             <a:endParaRPr lang="en-US"/>
           </a:p>
@@ -36088,37 +36087,20 @@
             <p:ph type="title"/>
           </p:nvPr>
         </p:nvSpPr>
-        <p:spPr/>
+        <p:spPr>
+          <a:xfrm>
+            <a:off x="582561" y="3226312"/>
+            <a:ext cx="10515600" cy="1325563"/>
+          </a:xfrm>
+        </p:spPr>
         <p:txBody>
           <a:bodyPr/>
           <a:lstStyle/>
           <a:p>
-            <a:endParaRPr lang="en-US"/>
-          </a:p>
-        </p:txBody>
-      </p:sp>
-      <p:sp>
-        <p:nvSpPr>
-          <p:cNvPr id="3" name="Content Placeholder 2">
-            <a:extLst>
-              <a:ext uri="{FF2B5EF4-FFF2-40B4-BE49-F238E27FC236}">
-                <a16:creationId xmlns:a16="http://schemas.microsoft.com/office/drawing/2014/main" id="{356ABC94-DD47-8825-7C6D-880D254E8D2F}"/>
-              </a:ext>
-            </a:extLst>
-          </p:cNvPr>
-          <p:cNvSpPr>
-            <a:spLocks noGrp="1"/>
-          </p:cNvSpPr>
-          <p:nvPr>
-            <p:ph idx="1"/>
-          </p:nvPr>
-        </p:nvSpPr>
-        <p:spPr/>
-        <p:txBody>
-          <a:bodyPr/>
-          <a:lstStyle/>
-          <a:p>
-            <a:endParaRPr lang="en-US"/>
+            <a:r>
+              <a:rPr lang="en-US" dirty="0"/>
+              <a:t>Examples </a:t>
+            </a:r>
           </a:p>
         </p:txBody>
       </p:sp>
@@ -37517,7 +37499,7 @@
           <p:cNvPr id="2" name="Title 1">
             <a:extLst>
               <a:ext uri="{FF2B5EF4-FFF2-40B4-BE49-F238E27FC236}">
-                <a16:creationId xmlns:a16="http://schemas.microsoft.com/office/drawing/2014/main" id="{218359D2-8C02-0366-05FB-C461581D8368}"/>
+                <a16:creationId xmlns:a16="http://schemas.microsoft.com/office/drawing/2014/main" id="{3B0A3E21-0AE0-0DB4-F8DD-9A5C4C161136}"/>
               </a:ext>
             </a:extLst>
           </p:cNvPr>
@@ -37533,7 +37515,17 @@
           <a:bodyPr/>
           <a:lstStyle/>
           <a:p>
-            <a:endParaRPr lang="en-US"/>
+            <a:r>
+              <a:rPr lang="en-US" b="1" i="0" dirty="0">
+                <a:solidFill>
+                  <a:srgbClr val="222222"/>
+                </a:solidFill>
+                <a:effectLst/>
+                <a:latin typeface="source sans pro" panose="020B0503030403020204" pitchFamily="34" charset="0"/>
+              </a:rPr>
+              <a:t>Logistic Regression</a:t>
+            </a:r>
+            <a:endParaRPr lang="en-US" dirty="0"/>
           </a:p>
         </p:txBody>
       </p:sp>
@@ -37542,7 +37534,7 @@
           <p:cNvPr id="3" name="Content Placeholder 2">
             <a:extLst>
               <a:ext uri="{FF2B5EF4-FFF2-40B4-BE49-F238E27FC236}">
-                <a16:creationId xmlns:a16="http://schemas.microsoft.com/office/drawing/2014/main" id="{E33C1B4B-EB40-0278-4348-1971F2712266}"/>
+                <a16:creationId xmlns:a16="http://schemas.microsoft.com/office/drawing/2014/main" id="{E0BBEC79-5436-996F-B306-E9304D95F64A}"/>
               </a:ext>
             </a:extLst>
           </p:cNvPr>
@@ -37553,19 +37545,145 @@
             <p:ph idx="1"/>
           </p:nvPr>
         </p:nvSpPr>
-        <p:spPr/>
+        <p:spPr>
+          <a:xfrm>
+            <a:off x="838200" y="1825625"/>
+            <a:ext cx="11113168" cy="4351338"/>
+          </a:xfrm>
+        </p:spPr>
         <p:txBody>
           <a:bodyPr/>
           <a:lstStyle/>
           <a:p>
-            <a:endParaRPr lang="en-US"/>
+            <a:r>
+              <a:rPr lang="en-US" dirty="0"/>
+              <a:t>Classification Algorithm (not regression) </a:t>
+            </a:r>
+          </a:p>
+          <a:p>
+            <a:r>
+              <a:rPr lang="en-US" b="0" i="0" dirty="0">
+                <a:solidFill>
+                  <a:srgbClr val="222222"/>
+                </a:solidFill>
+                <a:effectLst/>
+                <a:latin typeface="source sans pro" panose="020B0503030403020204" pitchFamily="34" charset="0"/>
+              </a:rPr>
+              <a:t>The nature of the dependent variables differentiates </a:t>
+            </a:r>
+            <a:r>
+              <a:rPr lang="en-US" b="0" i="0" u="none" strike="noStrike" dirty="0">
+                <a:solidFill>
+                  <a:srgbClr val="619CCD"/>
+                </a:solidFill>
+                <a:effectLst/>
+                <a:latin typeface="source sans pro" panose="020B0503030403020204" pitchFamily="34" charset="0"/>
+              </a:rPr>
+              <a:t>regression</a:t>
+            </a:r>
+            <a:r>
+              <a:rPr lang="en-US" b="0" i="0" dirty="0">
+                <a:solidFill>
+                  <a:srgbClr val="222222"/>
+                </a:solidFill>
+                <a:effectLst/>
+                <a:latin typeface="source sans pro" panose="020B0503030403020204" pitchFamily="34" charset="0"/>
+              </a:rPr>
+              <a:t> and classification problems</a:t>
+            </a:r>
+          </a:p>
+          <a:p>
+            <a:pPr lvl="1"/>
+            <a:r>
+              <a:rPr lang="en-US" b="1" i="0" dirty="0">
+                <a:solidFill>
+                  <a:srgbClr val="222222"/>
+                </a:solidFill>
+                <a:effectLst/>
+                <a:latin typeface="source sans pro" panose="020B0503030403020204" pitchFamily="34" charset="0"/>
+              </a:rPr>
+              <a:t>Regression</a:t>
+            </a:r>
+            <a:r>
+              <a:rPr lang="en-US" b="0" i="0" dirty="0">
+                <a:solidFill>
+                  <a:srgbClr val="222222"/>
+                </a:solidFill>
+                <a:effectLst/>
+                <a:latin typeface="source sans pro" panose="020B0503030403020204" pitchFamily="34" charset="0"/>
+              </a:rPr>
+              <a:t> problems have continuous and usually unbounded outputs. An example is when you’re estimating the salary as a function of experience and education level. </a:t>
+            </a:r>
+          </a:p>
+          <a:p>
+            <a:pPr lvl="1"/>
+            <a:r>
+              <a:rPr lang="en-US" b="1" dirty="0">
+                <a:solidFill>
+                  <a:srgbClr val="222222"/>
+                </a:solidFill>
+                <a:latin typeface="source sans pro" panose="020B0503030403020204" pitchFamily="34" charset="0"/>
+              </a:rPr>
+              <a:t>Cl</a:t>
+            </a:r>
+            <a:r>
+              <a:rPr lang="en-US" b="1" i="0" dirty="0">
+                <a:solidFill>
+                  <a:srgbClr val="222222"/>
+                </a:solidFill>
+                <a:effectLst/>
+                <a:latin typeface="source sans pro" panose="020B0503030403020204" pitchFamily="34" charset="0"/>
+              </a:rPr>
+              <a:t>assification</a:t>
+            </a:r>
+            <a:r>
+              <a:rPr lang="en-US" b="0" i="0" dirty="0">
+                <a:solidFill>
+                  <a:srgbClr val="222222"/>
+                </a:solidFill>
+                <a:effectLst/>
+                <a:latin typeface="source sans pro" panose="020B0503030403020204" pitchFamily="34" charset="0"/>
+              </a:rPr>
+              <a:t> problems have discrete and finite outputs called </a:t>
+            </a:r>
+            <a:r>
+              <a:rPr lang="en-US" b="1" i="0" dirty="0">
+                <a:solidFill>
+                  <a:srgbClr val="222222"/>
+                </a:solidFill>
+                <a:effectLst/>
+                <a:latin typeface="source sans pro" panose="020B0503030403020204" pitchFamily="34" charset="0"/>
+              </a:rPr>
+              <a:t>classes</a:t>
+            </a:r>
+            <a:r>
+              <a:rPr lang="en-US" b="0" i="0" dirty="0">
+                <a:solidFill>
+                  <a:srgbClr val="222222"/>
+                </a:solidFill>
+                <a:effectLst/>
+                <a:latin typeface="source sans pro" panose="020B0503030403020204" pitchFamily="34" charset="0"/>
+              </a:rPr>
+              <a:t> or </a:t>
+            </a:r>
+            <a:r>
+              <a:rPr lang="en-US" b="1" i="0" dirty="0">
+                <a:solidFill>
+                  <a:srgbClr val="222222"/>
+                </a:solidFill>
+                <a:effectLst/>
+                <a:latin typeface="source sans pro" panose="020B0503030403020204" pitchFamily="34" charset="0"/>
+              </a:rPr>
+              <a:t>categories</a:t>
+            </a:r>
+            <a:endParaRPr lang="en-US" dirty="0"/>
           </a:p>
         </p:txBody>
       </p:sp>
     </p:spTree>
     <p:extLst>
       <p:ext uri="{BB962C8B-B14F-4D97-AF65-F5344CB8AC3E}">
-        <p14:creationId xmlns:p14="http://schemas.microsoft.com/office/powerpoint/2010/main" val="4065146990"/>
+        <p14:creationId xmlns:p14="http://schemas.microsoft.com/office/powerpoint/2010/main" val="3619120351"/>
       </p:ext>
     </p:extLst>
   </p:cSld>
@@ -38422,222 +38540,6 @@
           <p:cNvPr id="2" name="Title 1">
             <a:extLst>
               <a:ext uri="{FF2B5EF4-FFF2-40B4-BE49-F238E27FC236}">
-                <a16:creationId xmlns:a16="http://schemas.microsoft.com/office/drawing/2014/main" id="{3B0A3E21-0AE0-0DB4-F8DD-9A5C4C161136}"/>
-              </a:ext>
-            </a:extLst>
-          </p:cNvPr>
-          <p:cNvSpPr>
-            <a:spLocks noGrp="1"/>
-          </p:cNvSpPr>
-          <p:nvPr>
-            <p:ph type="title"/>
-          </p:nvPr>
-        </p:nvSpPr>
-        <p:spPr/>
-        <p:txBody>
-          <a:bodyPr/>
-          <a:lstStyle/>
-          <a:p>
-            <a:r>
-              <a:rPr lang="en-US" b="1" i="0" dirty="0">
-                <a:solidFill>
-                  <a:srgbClr val="222222"/>
-                </a:solidFill>
-                <a:effectLst/>
-                <a:latin typeface="source sans pro" panose="020B0503030403020204" pitchFamily="34" charset="0"/>
-              </a:rPr>
-              <a:t>Logistic Regression</a:t>
-            </a:r>
-            <a:endParaRPr lang="en-US" dirty="0"/>
-          </a:p>
-        </p:txBody>
-      </p:sp>
-      <p:sp>
-        <p:nvSpPr>
-          <p:cNvPr id="3" name="Content Placeholder 2">
-            <a:extLst>
-              <a:ext uri="{FF2B5EF4-FFF2-40B4-BE49-F238E27FC236}">
-                <a16:creationId xmlns:a16="http://schemas.microsoft.com/office/drawing/2014/main" id="{E0BBEC79-5436-996F-B306-E9304D95F64A}"/>
-              </a:ext>
-            </a:extLst>
-          </p:cNvPr>
-          <p:cNvSpPr>
-            <a:spLocks noGrp="1"/>
-          </p:cNvSpPr>
-          <p:nvPr>
-            <p:ph idx="1"/>
-          </p:nvPr>
-        </p:nvSpPr>
-        <p:spPr>
-          <a:xfrm>
-            <a:off x="838200" y="1825625"/>
-            <a:ext cx="11113168" cy="4351338"/>
-          </a:xfrm>
-        </p:spPr>
-        <p:txBody>
-          <a:bodyPr/>
-          <a:lstStyle/>
-          <a:p>
-            <a:r>
-              <a:rPr lang="en-US" dirty="0"/>
-              <a:t>Classification Algorithm (not regression) </a:t>
-            </a:r>
-          </a:p>
-          <a:p>
-            <a:r>
-              <a:rPr lang="en-US" b="0" i="0" dirty="0">
-                <a:solidFill>
-                  <a:srgbClr val="222222"/>
-                </a:solidFill>
-                <a:effectLst/>
-                <a:latin typeface="source sans pro" panose="020B0503030403020204" pitchFamily="34" charset="0"/>
-              </a:rPr>
-              <a:t>The nature of the dependent variables differentiates </a:t>
-            </a:r>
-            <a:r>
-              <a:rPr lang="en-US" b="0" i="0" u="none" strike="noStrike" dirty="0">
-                <a:solidFill>
-                  <a:srgbClr val="619CCD"/>
-                </a:solidFill>
-                <a:effectLst/>
-                <a:latin typeface="source sans pro" panose="020B0503030403020204" pitchFamily="34" charset="0"/>
-              </a:rPr>
-              <a:t>regression</a:t>
-            </a:r>
-            <a:r>
-              <a:rPr lang="en-US" b="0" i="0" dirty="0">
-                <a:solidFill>
-                  <a:srgbClr val="222222"/>
-                </a:solidFill>
-                <a:effectLst/>
-                <a:latin typeface="source sans pro" panose="020B0503030403020204" pitchFamily="34" charset="0"/>
-              </a:rPr>
-              <a:t> and classification problems</a:t>
-            </a:r>
-          </a:p>
-          <a:p>
-            <a:pPr lvl="1"/>
-            <a:r>
-              <a:rPr lang="en-US" b="1" i="0" dirty="0">
-                <a:solidFill>
-                  <a:srgbClr val="222222"/>
-                </a:solidFill>
-                <a:effectLst/>
-                <a:latin typeface="source sans pro" panose="020B0503030403020204" pitchFamily="34" charset="0"/>
-              </a:rPr>
-              <a:t>Regression</a:t>
-            </a:r>
-            <a:r>
-              <a:rPr lang="en-US" b="0" i="0" dirty="0">
-                <a:solidFill>
-                  <a:srgbClr val="222222"/>
-                </a:solidFill>
-                <a:effectLst/>
-                <a:latin typeface="source sans pro" panose="020B0503030403020204" pitchFamily="34" charset="0"/>
-              </a:rPr>
-              <a:t> problems have continuous and usually unbounded outputs. An example is when you’re estimating the salary as a function of experience and education level. </a:t>
-            </a:r>
-          </a:p>
-          <a:p>
-            <a:pPr lvl="1"/>
-            <a:r>
-              <a:rPr lang="en-US" b="1" dirty="0">
-                <a:solidFill>
-                  <a:srgbClr val="222222"/>
-                </a:solidFill>
-                <a:latin typeface="source sans pro" panose="020B0503030403020204" pitchFamily="34" charset="0"/>
-              </a:rPr>
-              <a:t>Cl</a:t>
-            </a:r>
-            <a:r>
-              <a:rPr lang="en-US" b="1" i="0" dirty="0">
-                <a:solidFill>
-                  <a:srgbClr val="222222"/>
-                </a:solidFill>
-                <a:effectLst/>
-                <a:latin typeface="source sans pro" panose="020B0503030403020204" pitchFamily="34" charset="0"/>
-              </a:rPr>
-              <a:t>assification</a:t>
-            </a:r>
-            <a:r>
-              <a:rPr lang="en-US" b="0" i="0" dirty="0">
-                <a:solidFill>
-                  <a:srgbClr val="222222"/>
-                </a:solidFill>
-                <a:effectLst/>
-                <a:latin typeface="source sans pro" panose="020B0503030403020204" pitchFamily="34" charset="0"/>
-              </a:rPr>
-              <a:t> problems have discrete and finite outputs called </a:t>
-            </a:r>
-            <a:r>
-              <a:rPr lang="en-US" b="1" i="0" dirty="0">
-                <a:solidFill>
-                  <a:srgbClr val="222222"/>
-                </a:solidFill>
-                <a:effectLst/>
-                <a:latin typeface="source sans pro" panose="020B0503030403020204" pitchFamily="34" charset="0"/>
-              </a:rPr>
-              <a:t>classes</a:t>
-            </a:r>
-            <a:r>
-              <a:rPr lang="en-US" b="0" i="0" dirty="0">
-                <a:solidFill>
-                  <a:srgbClr val="222222"/>
-                </a:solidFill>
-                <a:effectLst/>
-                <a:latin typeface="source sans pro" panose="020B0503030403020204" pitchFamily="34" charset="0"/>
-              </a:rPr>
-              <a:t> or </a:t>
-            </a:r>
-            <a:r>
-              <a:rPr lang="en-US" b="1" i="0" dirty="0">
-                <a:solidFill>
-                  <a:srgbClr val="222222"/>
-                </a:solidFill>
-                <a:effectLst/>
-                <a:latin typeface="source sans pro" panose="020B0503030403020204" pitchFamily="34" charset="0"/>
-              </a:rPr>
-              <a:t>categories</a:t>
-            </a:r>
-            <a:endParaRPr lang="en-US" dirty="0"/>
-          </a:p>
-        </p:txBody>
-      </p:sp>
-    </p:spTree>
-    <p:extLst>
-      <p:ext uri="{BB962C8B-B14F-4D97-AF65-F5344CB8AC3E}">
-        <p14:creationId xmlns:p14="http://schemas.microsoft.com/office/powerpoint/2010/main" val="3619120351"/>
-      </p:ext>
-    </p:extLst>
-  </p:cSld>
-  <p:clrMapOvr>
-    <a:masterClrMapping/>
-  </p:clrMapOvr>
-</p:sld>
-</file>
-
-<file path=ppt/slides/slide41.xml><?xml version="1.0" encoding="utf-8"?>
-<p:sld xmlns:a="http://schemas.openxmlformats.org/drawingml/2006/main" xmlns:r="http://schemas.openxmlformats.org/officeDocument/2006/relationships" xmlns:p="http://schemas.openxmlformats.org/presentationml/2006/main">
-  <p:cSld>
-    <p:spTree>
-      <p:nvGrpSpPr>
-        <p:cNvPr id="1" name=""/>
-        <p:cNvGrpSpPr/>
-        <p:nvPr/>
-      </p:nvGrpSpPr>
-      <p:grpSpPr>
-        <a:xfrm>
-          <a:off x="0" y="0"/>
-          <a:ext cx="0" cy="0"/>
-          <a:chOff x="0" y="0"/>
-          <a:chExt cx="0" cy="0"/>
-        </a:xfrm>
-      </p:grpSpPr>
-      <p:sp>
-        <p:nvSpPr>
-          <p:cNvPr id="2" name="Title 1">
-            <a:extLst>
-              <a:ext uri="{FF2B5EF4-FFF2-40B4-BE49-F238E27FC236}">
                 <a16:creationId xmlns:a16="http://schemas.microsoft.com/office/drawing/2014/main" id="{A6598D5A-1D81-C739-6EE0-C0CF9406C4F5}"/>
               </a:ext>
             </a:extLst>
@@ -38845,7 +38747,7 @@
 </p:sld>
 </file>
 
-<file path=ppt/slides/slide42.xml><?xml version="1.0" encoding="utf-8"?>
+<file path=ppt/slides/slide41.xml><?xml version="1.0" encoding="utf-8"?>
 <p:sld xmlns:a="http://schemas.openxmlformats.org/drawingml/2006/main" xmlns:r="http://schemas.openxmlformats.org/officeDocument/2006/relationships" xmlns:p="http://schemas.openxmlformats.org/presentationml/2006/main">
   <p:cSld>
     <p:spTree>
@@ -39032,7 +38934,7 @@
 </p:sld>
 </file>
 
-<file path=ppt/slides/slide43.xml><?xml version="1.0" encoding="utf-8"?>
+<file path=ppt/slides/slide42.xml><?xml version="1.0" encoding="utf-8"?>
 <p:sld xmlns:a="http://schemas.openxmlformats.org/drawingml/2006/main" xmlns:r="http://schemas.openxmlformats.org/officeDocument/2006/relationships" xmlns:p="http://schemas.openxmlformats.org/presentationml/2006/main">
   <p:cSld>
     <p:spTree>
@@ -39185,22 +39087,6 @@
               <a:rPr lang="en-US" dirty="0"/>
               <a:t>The sigmoid function has values very close to either 0 or 1 across most of its domain. This fact makes it suitable for application in classification methods.</a:t>
             </a:r>
-          </a:p>
-          <a:p>
-            <a:r>
-              <a:rPr lang="en-US" b="0" i="0" dirty="0">
-                <a:solidFill>
-                  <a:srgbClr val="222222"/>
-                </a:solidFill>
-                <a:effectLst/>
-                <a:latin typeface="source sans pro" panose="020B0503030403020204" pitchFamily="34" charset="0"/>
-              </a:rPr>
-              <a:t>As 𝑥 approaches zero, the natural logarithm of 𝑥 drops towards negative infinity. When 𝑥 = 1, log(𝑥) is 0.</a:t>
-            </a:r>
-            <a:endParaRPr lang="en-US" dirty="0"/>
-          </a:p>
-          <a:p>
-            <a:endParaRPr lang="en-US" dirty="0"/>
           </a:p>
           <a:p>
             <a:endParaRPr lang="en-US" dirty="0"/>
@@ -39267,7 +39153,7 @@
 </p:sld>
 </file>
 
-<file path=ppt/slides/slide44.xml><?xml version="1.0" encoding="utf-8"?>
+<file path=ppt/slides/slide43.xml><?xml version="1.0" encoding="utf-8"?>
 <p:sld xmlns:a="http://schemas.openxmlformats.org/drawingml/2006/main" xmlns:r="http://schemas.openxmlformats.org/officeDocument/2006/relationships" xmlns:p="http://schemas.openxmlformats.org/presentationml/2006/main">
   <p:cSld>
     <p:spTree>
@@ -39513,7 +39399,7 @@
 </p:sld>
 </file>
 
-<file path=ppt/slides/slide45.xml><?xml version="1.0" encoding="utf-8"?>
+<file path=ppt/slides/slide44.xml><?xml version="1.0" encoding="utf-8"?>
 <p:sld xmlns:a="http://schemas.openxmlformats.org/drawingml/2006/main" xmlns:r="http://schemas.openxmlformats.org/officeDocument/2006/relationships" xmlns:p="http://schemas.openxmlformats.org/presentationml/2006/main">
   <p:cSld>
     <p:spTree>
@@ -39730,7 +39616,7 @@
 </p:sld>
 </file>
 
-<file path=ppt/slides/slide46.xml><?xml version="1.0" encoding="utf-8"?>
+<file path=ppt/slides/slide45.xml><?xml version="1.0" encoding="utf-8"?>
 <p:sld xmlns:a="http://schemas.openxmlformats.org/drawingml/2006/main" xmlns:r="http://schemas.openxmlformats.org/officeDocument/2006/relationships" xmlns:p="http://schemas.openxmlformats.org/presentationml/2006/main">
   <p:cSld>
     <p:spTree>
@@ -39866,7 +39752,7 @@
 </p:sld>
 </file>
 
-<file path=ppt/slides/slide47.xml><?xml version="1.0" encoding="utf-8"?>
+<file path=ppt/slides/slide46.xml><?xml version="1.0" encoding="utf-8"?>
 <p:sld xmlns:a="http://schemas.openxmlformats.org/drawingml/2006/main" xmlns:r="http://schemas.openxmlformats.org/officeDocument/2006/relationships" xmlns:p="http://schemas.openxmlformats.org/presentationml/2006/main">
   <p:cSld>
     <p:spTree>
@@ -40035,7 +39921,7 @@
 </p:sld>
 </file>
 
-<file path=ppt/slides/slide48.xml><?xml version="1.0" encoding="utf-8"?>
+<file path=ppt/slides/slide47.xml><?xml version="1.0" encoding="utf-8"?>
 <p:sld xmlns:a="http://schemas.openxmlformats.org/drawingml/2006/main" xmlns:r="http://schemas.openxmlformats.org/officeDocument/2006/relationships" xmlns:p="http://schemas.openxmlformats.org/presentationml/2006/main">
   <p:cSld>
     <p:spTree>
@@ -40176,7 +40062,7 @@
 </p:sld>
 </file>
 
-<file path=ppt/slides/slide49.xml><?xml version="1.0" encoding="utf-8"?>
+<file path=ppt/slides/slide48.xml><?xml version="1.0" encoding="utf-8"?>
 <p:sld xmlns:a="http://schemas.openxmlformats.org/drawingml/2006/main" xmlns:r="http://schemas.openxmlformats.org/officeDocument/2006/relationships" xmlns:p="http://schemas.openxmlformats.org/presentationml/2006/main">
   <p:cSld>
     <p:spTree>
@@ -40284,6 +40170,180 @@
     <p:extLst>
       <p:ext uri="{BB962C8B-B14F-4D97-AF65-F5344CB8AC3E}">
         <p14:creationId xmlns:p14="http://schemas.microsoft.com/office/powerpoint/2010/main" val="2476387805"/>
+      </p:ext>
+    </p:extLst>
+  </p:cSld>
+  <p:clrMapOvr>
+    <a:masterClrMapping/>
+  </p:clrMapOvr>
+</p:sld>
+</file>
+
+<file path=ppt/slides/slide49.xml><?xml version="1.0" encoding="utf-8"?>
+<p:sld xmlns:a="http://schemas.openxmlformats.org/drawingml/2006/main" xmlns:r="http://schemas.openxmlformats.org/officeDocument/2006/relationships" xmlns:p="http://schemas.openxmlformats.org/presentationml/2006/main">
+  <p:cSld>
+    <p:spTree>
+      <p:nvGrpSpPr>
+        <p:cNvPr id="1" name=""/>
+        <p:cNvGrpSpPr/>
+        <p:nvPr/>
+      </p:nvGrpSpPr>
+      <p:grpSpPr>
+        <a:xfrm>
+          <a:off x="0" y="0"/>
+          <a:ext cx="0" cy="0"/>
+          <a:chOff x="0" y="0"/>
+          <a:chExt cx="0" cy="0"/>
+        </a:xfrm>
+      </p:grpSpPr>
+      <p:sp>
+        <p:nvSpPr>
+          <p:cNvPr id="2" name="Title 1">
+            <a:extLst>
+              <a:ext uri="{FF2B5EF4-FFF2-40B4-BE49-F238E27FC236}">
+                <a16:creationId xmlns:a16="http://schemas.microsoft.com/office/drawing/2014/main" id="{7A3F111A-7773-1355-E3E9-961D9912211A}"/>
+              </a:ext>
+            </a:extLst>
+          </p:cNvPr>
+          <p:cNvSpPr>
+            <a:spLocks noGrp="1"/>
+          </p:cNvSpPr>
+          <p:nvPr>
+            <p:ph type="title"/>
+          </p:nvPr>
+        </p:nvSpPr>
+        <p:spPr/>
+        <p:txBody>
+          <a:bodyPr>
+            <a:normAutofit/>
+          </a:bodyPr>
+          <a:lstStyle/>
+          <a:p>
+            <a:r>
+              <a:rPr lang="en-US" b="0" i="0" dirty="0">
+                <a:solidFill>
+                  <a:srgbClr val="222222"/>
+                </a:solidFill>
+                <a:effectLst/>
+                <a:latin typeface="source sans pro" panose="020B0503030403020204" pitchFamily="34" charset="0"/>
+              </a:rPr>
+              <a:t>Multi-Variate Logistic Regression</a:t>
+            </a:r>
+            <a:endParaRPr lang="en-US" dirty="0"/>
+          </a:p>
+        </p:txBody>
+      </p:sp>
+      <p:sp>
+        <p:nvSpPr>
+          <p:cNvPr id="3" name="Content Placeholder 2">
+            <a:extLst>
+              <a:ext uri="{FF2B5EF4-FFF2-40B4-BE49-F238E27FC236}">
+                <a16:creationId xmlns:a16="http://schemas.microsoft.com/office/drawing/2014/main" id="{080B4951-734B-A0CD-17A9-1D210D83904B}"/>
+              </a:ext>
+            </a:extLst>
+          </p:cNvPr>
+          <p:cNvSpPr>
+            <a:spLocks noGrp="1"/>
+          </p:cNvSpPr>
+          <p:nvPr>
+            <p:ph idx="1"/>
+          </p:nvPr>
+        </p:nvSpPr>
+        <p:spPr>
+          <a:xfrm>
+            <a:off x="260684" y="1456657"/>
+            <a:ext cx="11353800" cy="4351338"/>
+          </a:xfrm>
+        </p:spPr>
+        <p:txBody>
+          <a:bodyPr/>
+          <a:lstStyle/>
+          <a:p>
+            <a:pPr algn="l"/>
+            <a:r>
+              <a:rPr lang="en-US" b="1" i="0" dirty="0">
+                <a:solidFill>
+                  <a:srgbClr val="222222"/>
+                </a:solidFill>
+                <a:effectLst/>
+                <a:latin typeface="source sans pro" panose="020B0503030403020204" pitchFamily="34" charset="0"/>
+              </a:rPr>
+              <a:t>Multi-variate logistic regression</a:t>
+            </a:r>
+            <a:r>
+              <a:rPr lang="en-US" b="0" i="0" dirty="0">
+                <a:solidFill>
+                  <a:srgbClr val="222222"/>
+                </a:solidFill>
+                <a:effectLst/>
+                <a:latin typeface="source sans pro" panose="020B0503030403020204" pitchFamily="34" charset="0"/>
+              </a:rPr>
+              <a:t> has more than one input variable. This figure shows the classification with two independent variables, 𝑥₁ and 𝑥₂</a:t>
+            </a:r>
+            <a:br>
+              <a:rPr lang="en-US" u="none" strike="noStrike" dirty="0">
+                <a:solidFill>
+                  <a:srgbClr val="619CCD"/>
+                </a:solidFill>
+                <a:effectLst/>
+                <a:hlinkClick r:id="rId2"/>
+              </a:rPr>
+            </a:br>
+            <a:endParaRPr lang="en-US" dirty="0"/>
+          </a:p>
+        </p:txBody>
+      </p:sp>
+      <p:pic>
+        <p:nvPicPr>
+          <p:cNvPr id="3074" name="Picture 2">
+            <a:extLst>
+              <a:ext uri="{FF2B5EF4-FFF2-40B4-BE49-F238E27FC236}">
+                <a16:creationId xmlns:a16="http://schemas.microsoft.com/office/drawing/2014/main" id="{630B915D-FF86-A3A7-817B-757D54238C2E}"/>
+              </a:ext>
+            </a:extLst>
+          </p:cNvPr>
+          <p:cNvPicPr>
+            <a:picLocks noChangeAspect="1" noChangeArrowheads="1"/>
+          </p:cNvPicPr>
+          <p:nvPr/>
+        </p:nvPicPr>
+        <p:blipFill>
+          <a:blip r:embed="rId3">
+            <a:extLst>
+              <a:ext uri="{28A0092B-C50C-407E-A947-70E740481C1C}">
+                <a14:useLocalDpi xmlns:a14="http://schemas.microsoft.com/office/drawing/2010/main" val="0"/>
+              </a:ext>
+            </a:extLst>
+          </a:blip>
+          <a:srcRect/>
+          <a:stretch>
+            <a:fillRect/>
+          </a:stretch>
+        </p:blipFill>
+        <p:spPr bwMode="auto">
+          <a:xfrm>
+            <a:off x="999372" y="2587787"/>
+            <a:ext cx="8866523" cy="4269658"/>
+          </a:xfrm>
+          <a:prstGeom prst="rect">
+            <a:avLst/>
+          </a:prstGeom>
+          <a:noFill/>
+          <a:extLst>
+            <a:ext uri="{909E8E84-426E-40DD-AFC4-6F175D3DCCD1}">
+              <a14:hiddenFill xmlns:a14="http://schemas.microsoft.com/office/drawing/2010/main">
+                <a:solidFill>
+                  <a:srgbClr val="FFFFFF"/>
+                </a:solidFill>
+              </a14:hiddenFill>
+            </a:ext>
+          </a:extLst>
+        </p:spPr>
+      </p:pic>
+    </p:spTree>
+    <p:extLst>
+      <p:ext uri="{BB962C8B-B14F-4D97-AF65-F5344CB8AC3E}">
+        <p14:creationId xmlns:p14="http://schemas.microsoft.com/office/powerpoint/2010/main" val="1133417639"/>
       </p:ext>
     </p:extLst>
   </p:cSld>
@@ -41065,180 +41125,6 @@
           <p:cNvPr id="2" name="Title 1">
             <a:extLst>
               <a:ext uri="{FF2B5EF4-FFF2-40B4-BE49-F238E27FC236}">
-                <a16:creationId xmlns:a16="http://schemas.microsoft.com/office/drawing/2014/main" id="{7A3F111A-7773-1355-E3E9-961D9912211A}"/>
-              </a:ext>
-            </a:extLst>
-          </p:cNvPr>
-          <p:cNvSpPr>
-            <a:spLocks noGrp="1"/>
-          </p:cNvSpPr>
-          <p:nvPr>
-            <p:ph type="title"/>
-          </p:nvPr>
-        </p:nvSpPr>
-        <p:spPr/>
-        <p:txBody>
-          <a:bodyPr>
-            <a:normAutofit/>
-          </a:bodyPr>
-          <a:lstStyle/>
-          <a:p>
-            <a:r>
-              <a:rPr lang="en-US" b="0" i="0" dirty="0">
-                <a:solidFill>
-                  <a:srgbClr val="222222"/>
-                </a:solidFill>
-                <a:effectLst/>
-                <a:latin typeface="source sans pro" panose="020B0503030403020204" pitchFamily="34" charset="0"/>
-              </a:rPr>
-              <a:t>Multi-Variate Logistic Regression</a:t>
-            </a:r>
-            <a:endParaRPr lang="en-US" dirty="0"/>
-          </a:p>
-        </p:txBody>
-      </p:sp>
-      <p:sp>
-        <p:nvSpPr>
-          <p:cNvPr id="3" name="Content Placeholder 2">
-            <a:extLst>
-              <a:ext uri="{FF2B5EF4-FFF2-40B4-BE49-F238E27FC236}">
-                <a16:creationId xmlns:a16="http://schemas.microsoft.com/office/drawing/2014/main" id="{080B4951-734B-A0CD-17A9-1D210D83904B}"/>
-              </a:ext>
-            </a:extLst>
-          </p:cNvPr>
-          <p:cNvSpPr>
-            <a:spLocks noGrp="1"/>
-          </p:cNvSpPr>
-          <p:nvPr>
-            <p:ph idx="1"/>
-          </p:nvPr>
-        </p:nvSpPr>
-        <p:spPr>
-          <a:xfrm>
-            <a:off x="260684" y="1456657"/>
-            <a:ext cx="11353800" cy="4351338"/>
-          </a:xfrm>
-        </p:spPr>
-        <p:txBody>
-          <a:bodyPr/>
-          <a:lstStyle/>
-          <a:p>
-            <a:pPr algn="l"/>
-            <a:r>
-              <a:rPr lang="en-US" b="1" i="0" dirty="0">
-                <a:solidFill>
-                  <a:srgbClr val="222222"/>
-                </a:solidFill>
-                <a:effectLst/>
-                <a:latin typeface="source sans pro" panose="020B0503030403020204" pitchFamily="34" charset="0"/>
-              </a:rPr>
-              <a:t>Multi-variate logistic regression</a:t>
-            </a:r>
-            <a:r>
-              <a:rPr lang="en-US" b="0" i="0" dirty="0">
-                <a:solidFill>
-                  <a:srgbClr val="222222"/>
-                </a:solidFill>
-                <a:effectLst/>
-                <a:latin typeface="source sans pro" panose="020B0503030403020204" pitchFamily="34" charset="0"/>
-              </a:rPr>
-              <a:t> has more than one input variable. This figure shows the classification with two independent variables, 𝑥₁ and 𝑥₂</a:t>
-            </a:r>
-            <a:br>
-              <a:rPr lang="en-US" u="none" strike="noStrike" dirty="0">
-                <a:solidFill>
-                  <a:srgbClr val="619CCD"/>
-                </a:solidFill>
-                <a:effectLst/>
-                <a:hlinkClick r:id="rId2"/>
-              </a:rPr>
-            </a:br>
-            <a:endParaRPr lang="en-US" dirty="0"/>
-          </a:p>
-        </p:txBody>
-      </p:sp>
-      <p:pic>
-        <p:nvPicPr>
-          <p:cNvPr id="3074" name="Picture 2">
-            <a:extLst>
-              <a:ext uri="{FF2B5EF4-FFF2-40B4-BE49-F238E27FC236}">
-                <a16:creationId xmlns:a16="http://schemas.microsoft.com/office/drawing/2014/main" id="{630B915D-FF86-A3A7-817B-757D54238C2E}"/>
-              </a:ext>
-            </a:extLst>
-          </p:cNvPr>
-          <p:cNvPicPr>
-            <a:picLocks noChangeAspect="1" noChangeArrowheads="1"/>
-          </p:cNvPicPr>
-          <p:nvPr/>
-        </p:nvPicPr>
-        <p:blipFill>
-          <a:blip r:embed="rId3">
-            <a:extLst>
-              <a:ext uri="{28A0092B-C50C-407E-A947-70E740481C1C}">
-                <a14:useLocalDpi xmlns:a14="http://schemas.microsoft.com/office/drawing/2010/main" val="0"/>
-              </a:ext>
-            </a:extLst>
-          </a:blip>
-          <a:srcRect/>
-          <a:stretch>
-            <a:fillRect/>
-          </a:stretch>
-        </p:blipFill>
-        <p:spPr bwMode="auto">
-          <a:xfrm>
-            <a:off x="999372" y="2587787"/>
-            <a:ext cx="8866523" cy="4269658"/>
-          </a:xfrm>
-          <a:prstGeom prst="rect">
-            <a:avLst/>
-          </a:prstGeom>
-          <a:noFill/>
-          <a:extLst>
-            <a:ext uri="{909E8E84-426E-40DD-AFC4-6F175D3DCCD1}">
-              <a14:hiddenFill xmlns:a14="http://schemas.microsoft.com/office/drawing/2010/main">
-                <a:solidFill>
-                  <a:srgbClr val="FFFFFF"/>
-                </a:solidFill>
-              </a14:hiddenFill>
-            </a:ext>
-          </a:extLst>
-        </p:spPr>
-      </p:pic>
-    </p:spTree>
-    <p:extLst>
-      <p:ext uri="{BB962C8B-B14F-4D97-AF65-F5344CB8AC3E}">
-        <p14:creationId xmlns:p14="http://schemas.microsoft.com/office/powerpoint/2010/main" val="1133417639"/>
-      </p:ext>
-    </p:extLst>
-  </p:cSld>
-  <p:clrMapOvr>
-    <a:masterClrMapping/>
-  </p:clrMapOvr>
-</p:sld>
-</file>
-
-<file path=ppt/slides/slide51.xml><?xml version="1.0" encoding="utf-8"?>
-<p:sld xmlns:a="http://schemas.openxmlformats.org/drawingml/2006/main" xmlns:r="http://schemas.openxmlformats.org/officeDocument/2006/relationships" xmlns:p="http://schemas.openxmlformats.org/presentationml/2006/main">
-  <p:cSld>
-    <p:spTree>
-      <p:nvGrpSpPr>
-        <p:cNvPr id="1" name=""/>
-        <p:cNvGrpSpPr/>
-        <p:nvPr/>
-      </p:nvGrpSpPr>
-      <p:grpSpPr>
-        <a:xfrm>
-          <a:off x="0" y="0"/>
-          <a:ext cx="0" cy="0"/>
-          <a:chOff x="0" y="0"/>
-          <a:chExt cx="0" cy="0"/>
-        </a:xfrm>
-      </p:grpSpPr>
-      <p:sp>
-        <p:nvSpPr>
-          <p:cNvPr id="2" name="Title 1">
-            <a:extLst>
-              <a:ext uri="{FF2B5EF4-FFF2-40B4-BE49-F238E27FC236}">
                 <a16:creationId xmlns:a16="http://schemas.microsoft.com/office/drawing/2014/main" id="{378E1C80-8398-892E-879E-09209C4482AC}"/>
               </a:ext>
             </a:extLst>
@@ -41387,7 +41273,7 @@
 </p:sld>
 </file>
 
-<file path=ppt/slides/slide52.xml><?xml version="1.0" encoding="utf-8"?>
+<file path=ppt/slides/slide51.xml><?xml version="1.0" encoding="utf-8"?>
 <p:sld xmlns:a="http://schemas.openxmlformats.org/drawingml/2006/main" xmlns:r="http://schemas.openxmlformats.org/officeDocument/2006/relationships" xmlns:p="http://schemas.openxmlformats.org/presentationml/2006/main">
   <p:cSld>
     <p:spTree>
@@ -41527,7 +41413,7 @@
 </p:sld>
 </file>
 
-<file path=ppt/slides/slide53.xml><?xml version="1.0" encoding="utf-8"?>
+<file path=ppt/slides/slide52.xml><?xml version="1.0" encoding="utf-8"?>
 <p:sld xmlns:a="http://schemas.openxmlformats.org/drawingml/2006/main" xmlns:r="http://schemas.openxmlformats.org/officeDocument/2006/relationships" xmlns:p="http://schemas.openxmlformats.org/presentationml/2006/main">
   <p:cSld>
     <p:spTree>
@@ -41630,7 +41516,7 @@
 </p:sld>
 </file>
 
-<file path=ppt/slides/slide54.xml><?xml version="1.0" encoding="utf-8"?>
+<file path=ppt/slides/slide53.xml><?xml version="1.0" encoding="utf-8"?>
 <p:sld xmlns:a="http://schemas.openxmlformats.org/drawingml/2006/main" xmlns:r="http://schemas.openxmlformats.org/officeDocument/2006/relationships" xmlns:p="http://schemas.openxmlformats.org/presentationml/2006/main">
   <p:cSld>
     <p:spTree>
@@ -41707,7 +41593,7 @@
 </p:sld>
 </file>
 
-<file path=ppt/slides/slide55.xml><?xml version="1.0" encoding="utf-8"?>
+<file path=ppt/slides/slide54.xml><?xml version="1.0" encoding="utf-8"?>
 <p:sld xmlns:a="http://schemas.openxmlformats.org/drawingml/2006/main" xmlns:r="http://schemas.openxmlformats.org/officeDocument/2006/relationships" xmlns:p="http://schemas.openxmlformats.org/presentationml/2006/main">
   <p:cSld>
     <p:spTree>

</xml_diff>